<commit_message>
Added slides related to forecasting
</commit_message>
<xml_diff>
--- a/Portfolio Diversifier.pptx
+++ b/Portfolio Diversifier.pptx
@@ -7,17 +7,19 @@
   <p:sldIdLst>
     <p:sldId id="256" r:id="rId2"/>
     <p:sldId id="257" r:id="rId3"/>
-    <p:sldId id="258" r:id="rId4"/>
-    <p:sldId id="259" r:id="rId5"/>
-    <p:sldId id="260" r:id="rId6"/>
-    <p:sldId id="261" r:id="rId7"/>
-    <p:sldId id="262" r:id="rId8"/>
-    <p:sldId id="263" r:id="rId9"/>
-    <p:sldId id="264" r:id="rId10"/>
-    <p:sldId id="265" r:id="rId11"/>
-    <p:sldId id="266" r:id="rId12"/>
-    <p:sldId id="267" r:id="rId13"/>
-    <p:sldId id="268" r:id="rId14"/>
+    <p:sldId id="270" r:id="rId4"/>
+    <p:sldId id="258" r:id="rId5"/>
+    <p:sldId id="259" r:id="rId6"/>
+    <p:sldId id="260" r:id="rId7"/>
+    <p:sldId id="261" r:id="rId8"/>
+    <p:sldId id="262" r:id="rId9"/>
+    <p:sldId id="263" r:id="rId10"/>
+    <p:sldId id="264" r:id="rId11"/>
+    <p:sldId id="265" r:id="rId12"/>
+    <p:sldId id="266" r:id="rId13"/>
+    <p:sldId id="267" r:id="rId14"/>
+    <p:sldId id="268" r:id="rId15"/>
+    <p:sldId id="269" r:id="rId16"/>
   </p:sldIdLst>
   <p:sldSz cx="12192000" cy="6858000"/>
   <p:notesSz cx="6858000" cy="9144000"/>
@@ -3427,6 +3429,72 @@
       </p:grpSpPr>
       <p:pic>
         <p:nvPicPr>
+          <p:cNvPr id="5" name="Picture 4" descr="Chart, waterfall chart&#10;&#10;Description automatically generated">
+            <a:extLst>
+              <a:ext uri="{FF2B5EF4-FFF2-40B4-BE49-F238E27FC236}">
+                <a16:creationId xmlns:a16="http://schemas.microsoft.com/office/drawing/2014/main" id="{5FFDE442-0C81-41D1-B661-F996A69E7357}"/>
+              </a:ext>
+            </a:extLst>
+          </p:cNvPr>
+          <p:cNvPicPr>
+            <a:picLocks noChangeAspect="1"/>
+          </p:cNvPicPr>
+          <p:nvPr/>
+        </p:nvPicPr>
+        <p:blipFill>
+          <a:blip r:embed="rId2">
+            <a:extLst>
+              <a:ext uri="{28A0092B-C50C-407E-A947-70E740481C1C}">
+                <a14:useLocalDpi xmlns:a14="http://schemas.microsoft.com/office/drawing/2010/main" val="0"/>
+              </a:ext>
+            </a:extLst>
+          </a:blip>
+          <a:stretch>
+            <a:fillRect/>
+          </a:stretch>
+        </p:blipFill>
+        <p:spPr>
+          <a:xfrm>
+            <a:off x="442684" y="963385"/>
+            <a:ext cx="11506201" cy="4931229"/>
+          </a:xfrm>
+          <a:prstGeom prst="rect">
+            <a:avLst/>
+          </a:prstGeom>
+        </p:spPr>
+      </p:pic>
+    </p:spTree>
+    <p:extLst>
+      <p:ext uri="{BB962C8B-B14F-4D97-AF65-F5344CB8AC3E}">
+        <p14:creationId xmlns:p14="http://schemas.microsoft.com/office/powerpoint/2010/main" val="45471021"/>
+      </p:ext>
+    </p:extLst>
+  </p:cSld>
+  <p:clrMapOvr>
+    <a:masterClrMapping/>
+  </p:clrMapOvr>
+</p:sld>
+</file>
+
+<file path=ppt/slides/slide11.xml><?xml version="1.0" encoding="utf-8"?>
+<p:sld xmlns:a="http://schemas.openxmlformats.org/drawingml/2006/main" xmlns:r="http://schemas.openxmlformats.org/officeDocument/2006/relationships" xmlns:p="http://schemas.openxmlformats.org/presentationml/2006/main">
+  <p:cSld>
+    <p:spTree>
+      <p:nvGrpSpPr>
+        <p:cNvPr id="1" name=""/>
+        <p:cNvGrpSpPr/>
+        <p:nvPr/>
+      </p:nvGrpSpPr>
+      <p:grpSpPr>
+        <a:xfrm>
+          <a:off x="0" y="0"/>
+          <a:ext cx="0" cy="0"/>
+          <a:chOff x="0" y="0"/>
+          <a:chExt cx="0" cy="0"/>
+        </a:xfrm>
+      </p:grpSpPr>
+      <p:pic>
+        <p:nvPicPr>
           <p:cNvPr id="5" name="Picture 4" descr="Chart, line chart&#10;&#10;Description automatically generated">
             <a:extLst>
               <a:ext uri="{FF2B5EF4-FFF2-40B4-BE49-F238E27FC236}">
@@ -3474,7 +3542,7 @@
 </p:sld>
 </file>
 
-<file path=ppt/slides/slide11.xml><?xml version="1.0" encoding="utf-8"?>
+<file path=ppt/slides/slide12.xml><?xml version="1.0" encoding="utf-8"?>
 <p:sld xmlns:a="http://schemas.openxmlformats.org/drawingml/2006/main" xmlns:r="http://schemas.openxmlformats.org/officeDocument/2006/relationships" xmlns:p="http://schemas.openxmlformats.org/presentationml/2006/main">
   <p:cSld>
     <p:spTree>
@@ -3522,7 +3590,7 @@
         <p:spPr>
           <a:xfrm>
             <a:off x="438150" y="301512"/>
-            <a:ext cx="8572500" cy="4286250"/>
+            <a:ext cx="11719604" cy="5859802"/>
           </a:xfrm>
         </p:spPr>
       </p:pic>
@@ -3530,72 +3598,6 @@
     <p:extLst>
       <p:ext uri="{BB962C8B-B14F-4D97-AF65-F5344CB8AC3E}">
         <p14:creationId xmlns:p14="http://schemas.microsoft.com/office/powerpoint/2010/main" val="3367828464"/>
-      </p:ext>
-    </p:extLst>
-  </p:cSld>
-  <p:clrMapOvr>
-    <a:masterClrMapping/>
-  </p:clrMapOvr>
-</p:sld>
-</file>
-
-<file path=ppt/slides/slide12.xml><?xml version="1.0" encoding="utf-8"?>
-<p:sld xmlns:a="http://schemas.openxmlformats.org/drawingml/2006/main" xmlns:r="http://schemas.openxmlformats.org/officeDocument/2006/relationships" xmlns:p="http://schemas.openxmlformats.org/presentationml/2006/main">
-  <p:cSld>
-    <p:spTree>
-      <p:nvGrpSpPr>
-        <p:cNvPr id="1" name=""/>
-        <p:cNvGrpSpPr/>
-        <p:nvPr/>
-      </p:nvGrpSpPr>
-      <p:grpSpPr>
-        <a:xfrm>
-          <a:off x="0" y="0"/>
-          <a:ext cx="0" cy="0"/>
-          <a:chOff x="0" y="0"/>
-          <a:chExt cx="0" cy="0"/>
-        </a:xfrm>
-      </p:grpSpPr>
-      <p:pic>
-        <p:nvPicPr>
-          <p:cNvPr id="5" name="Picture 4" descr="Chart&#10;&#10;Description automatically generated">
-            <a:extLst>
-              <a:ext uri="{FF2B5EF4-FFF2-40B4-BE49-F238E27FC236}">
-                <a16:creationId xmlns:a16="http://schemas.microsoft.com/office/drawing/2014/main" id="{F325298B-E8E4-4742-A455-9A8DD1BF3160}"/>
-              </a:ext>
-            </a:extLst>
-          </p:cNvPr>
-          <p:cNvPicPr>
-            <a:picLocks noChangeAspect="1"/>
-          </p:cNvPicPr>
-          <p:nvPr/>
-        </p:nvPicPr>
-        <p:blipFill>
-          <a:blip r:embed="rId2">
-            <a:extLst>
-              <a:ext uri="{28A0092B-C50C-407E-A947-70E740481C1C}">
-                <a14:useLocalDpi xmlns:a14="http://schemas.microsoft.com/office/drawing/2010/main" val="0"/>
-              </a:ext>
-            </a:extLst>
-          </a:blip>
-          <a:stretch>
-            <a:fillRect/>
-          </a:stretch>
-        </p:blipFill>
-        <p:spPr>
-          <a:xfrm>
-            <a:off x="175533" y="360589"/>
-            <a:ext cx="11840934" cy="5920467"/>
-          </a:xfrm>
-          <a:prstGeom prst="rect">
-            <a:avLst/>
-          </a:prstGeom>
-        </p:spPr>
-      </p:pic>
-    </p:spTree>
-    <p:extLst>
-      <p:ext uri="{BB962C8B-B14F-4D97-AF65-F5344CB8AC3E}">
-        <p14:creationId xmlns:p14="http://schemas.microsoft.com/office/powerpoint/2010/main" val="2003586543"/>
       </p:ext>
     </p:extLst>
   </p:cSld>
@@ -3627,6 +3629,72 @@
           <p:cNvPr id="5" name="Picture 4" descr="Chart&#10;&#10;Description automatically generated">
             <a:extLst>
               <a:ext uri="{FF2B5EF4-FFF2-40B4-BE49-F238E27FC236}">
+                <a16:creationId xmlns:a16="http://schemas.microsoft.com/office/drawing/2014/main" id="{F325298B-E8E4-4742-A455-9A8DD1BF3160}"/>
+              </a:ext>
+            </a:extLst>
+          </p:cNvPr>
+          <p:cNvPicPr>
+            <a:picLocks noChangeAspect="1"/>
+          </p:cNvPicPr>
+          <p:nvPr/>
+        </p:nvPicPr>
+        <p:blipFill>
+          <a:blip r:embed="rId2">
+            <a:extLst>
+              <a:ext uri="{28A0092B-C50C-407E-A947-70E740481C1C}">
+                <a14:useLocalDpi xmlns:a14="http://schemas.microsoft.com/office/drawing/2010/main" val="0"/>
+              </a:ext>
+            </a:extLst>
+          </a:blip>
+          <a:stretch>
+            <a:fillRect/>
+          </a:stretch>
+        </p:blipFill>
+        <p:spPr>
+          <a:xfrm>
+            <a:off x="175533" y="360589"/>
+            <a:ext cx="11840934" cy="5920467"/>
+          </a:xfrm>
+          <a:prstGeom prst="rect">
+            <a:avLst/>
+          </a:prstGeom>
+        </p:spPr>
+      </p:pic>
+    </p:spTree>
+    <p:extLst>
+      <p:ext uri="{BB962C8B-B14F-4D97-AF65-F5344CB8AC3E}">
+        <p14:creationId xmlns:p14="http://schemas.microsoft.com/office/powerpoint/2010/main" val="2003586543"/>
+      </p:ext>
+    </p:extLst>
+  </p:cSld>
+  <p:clrMapOvr>
+    <a:masterClrMapping/>
+  </p:clrMapOvr>
+</p:sld>
+</file>
+
+<file path=ppt/slides/slide14.xml><?xml version="1.0" encoding="utf-8"?>
+<p:sld xmlns:a="http://schemas.openxmlformats.org/drawingml/2006/main" xmlns:r="http://schemas.openxmlformats.org/officeDocument/2006/relationships" xmlns:p="http://schemas.openxmlformats.org/presentationml/2006/main">
+  <p:cSld>
+    <p:spTree>
+      <p:nvGrpSpPr>
+        <p:cNvPr id="1" name=""/>
+        <p:cNvGrpSpPr/>
+        <p:nvPr/>
+      </p:nvGrpSpPr>
+      <p:grpSpPr>
+        <a:xfrm>
+          <a:off x="0" y="0"/>
+          <a:ext cx="0" cy="0"/>
+          <a:chOff x="0" y="0"/>
+          <a:chExt cx="0" cy="0"/>
+        </a:xfrm>
+      </p:grpSpPr>
+      <p:pic>
+        <p:nvPicPr>
+          <p:cNvPr id="5" name="Picture 4" descr="Chart&#10;&#10;Description automatically generated">
+            <a:extLst>
+              <a:ext uri="{FF2B5EF4-FFF2-40B4-BE49-F238E27FC236}">
                 <a16:creationId xmlns:a16="http://schemas.microsoft.com/office/drawing/2014/main" id="{CE7725CD-BECE-423B-A5F8-EAEE1B072323}"/>
               </a:ext>
             </a:extLst>
@@ -3662,6 +3730,592 @@
     <p:extLst>
       <p:ext uri="{BB962C8B-B14F-4D97-AF65-F5344CB8AC3E}">
         <p14:creationId xmlns:p14="http://schemas.microsoft.com/office/powerpoint/2010/main" val="761059145"/>
+      </p:ext>
+    </p:extLst>
+  </p:cSld>
+  <p:clrMapOvr>
+    <a:masterClrMapping/>
+  </p:clrMapOvr>
+</p:sld>
+</file>
+
+<file path=ppt/slides/slide15.xml><?xml version="1.0" encoding="utf-8"?>
+<p:sld xmlns:a="http://schemas.openxmlformats.org/drawingml/2006/main" xmlns:r="http://schemas.openxmlformats.org/officeDocument/2006/relationships" xmlns:p="http://schemas.openxmlformats.org/presentationml/2006/main">
+  <p:cSld>
+    <p:spTree>
+      <p:nvGrpSpPr>
+        <p:cNvPr id="1" name=""/>
+        <p:cNvGrpSpPr/>
+        <p:nvPr/>
+      </p:nvGrpSpPr>
+      <p:grpSpPr>
+        <a:xfrm>
+          <a:off x="0" y="0"/>
+          <a:ext cx="0" cy="0"/>
+          <a:chOff x="0" y="0"/>
+          <a:chExt cx="0" cy="0"/>
+        </a:xfrm>
+      </p:grpSpPr>
+      <p:pic>
+        <p:nvPicPr>
+          <p:cNvPr id="5" name="Picture 4" descr="Chart, scatter chart&#10;&#10;Description automatically generated">
+            <a:extLst>
+              <a:ext uri="{FF2B5EF4-FFF2-40B4-BE49-F238E27FC236}">
+                <a16:creationId xmlns:a16="http://schemas.microsoft.com/office/drawing/2014/main" id="{D60B0A87-C0E5-4485-A648-8AD2BE6AC9F1}"/>
+              </a:ext>
+            </a:extLst>
+          </p:cNvPr>
+          <p:cNvPicPr>
+            <a:picLocks noChangeAspect="1"/>
+          </p:cNvPicPr>
+          <p:nvPr/>
+        </p:nvPicPr>
+        <p:blipFill>
+          <a:blip r:embed="rId2">
+            <a:extLst>
+              <a:ext uri="{28A0092B-C50C-407E-A947-70E740481C1C}">
+                <a14:useLocalDpi xmlns:a14="http://schemas.microsoft.com/office/drawing/2010/main" val="0"/>
+              </a:ext>
+            </a:extLst>
+          </a:blip>
+          <a:stretch>
+            <a:fillRect/>
+          </a:stretch>
+        </p:blipFill>
+        <p:spPr>
+          <a:xfrm>
+            <a:off x="2401778" y="266735"/>
+            <a:ext cx="9326996" cy="4252723"/>
+          </a:xfrm>
+          <a:prstGeom prst="rect">
+            <a:avLst/>
+          </a:prstGeom>
+        </p:spPr>
+      </p:pic>
+      <p:sp>
+        <p:nvSpPr>
+          <p:cNvPr id="8" name="Rectangle 2">
+            <a:extLst>
+              <a:ext uri="{FF2B5EF4-FFF2-40B4-BE49-F238E27FC236}">
+                <a16:creationId xmlns:a16="http://schemas.microsoft.com/office/drawing/2014/main" id="{961112B1-22AF-4B41-B736-AA86970B59AC}"/>
+              </a:ext>
+            </a:extLst>
+          </p:cNvPr>
+          <p:cNvSpPr>
+            <a:spLocks noChangeArrowheads="1"/>
+          </p:cNvSpPr>
+          <p:nvPr/>
+        </p:nvSpPr>
+        <p:spPr bwMode="auto">
+          <a:xfrm>
+            <a:off x="403859" y="1081052"/>
+            <a:ext cx="1997919" cy="2462213"/>
+          </a:xfrm>
+          <a:prstGeom prst="rect">
+            <a:avLst/>
+          </a:prstGeom>
+          <a:solidFill>
+            <a:srgbClr val="FFFFFF"/>
+          </a:solidFill>
+          <a:ln>
+            <a:noFill/>
+          </a:ln>
+          <a:effectLst/>
+          <a:extLst>
+            <a:ext uri="{91240B29-F687-4F45-9708-019B960494DF}">
+              <a14:hiddenLine xmlns:a14="http://schemas.microsoft.com/office/drawing/2010/main" w="9525">
+                <a:solidFill>
+                  <a:schemeClr val="tx1"/>
+                </a:solidFill>
+                <a:miter lim="800000"/>
+                <a:headEnd/>
+                <a:tailEnd/>
+              </a14:hiddenLine>
+            </a:ext>
+            <a:ext uri="{AF507438-7753-43E0-B8FC-AC1667EBCBE1}">
+              <a14:hiddenEffects xmlns:a14="http://schemas.microsoft.com/office/drawing/2010/main">
+                <a:effectLst>
+                  <a:outerShdw dist="35921" dir="2700000" algn="ctr" rotWithShape="0">
+                    <a:schemeClr val="bg2"/>
+                  </a:outerShdw>
+                </a:effectLst>
+              </a14:hiddenEffects>
+            </a:ext>
+          </a:extLst>
+        </p:spPr>
+        <p:txBody>
+          <a:bodyPr vert="horz" wrap="none" lIns="0" tIns="0" rIns="0" bIns="0" numCol="1" anchor="ctr" anchorCtr="0" compatLnSpc="1">
+            <a:prstTxWarp prst="textNoShape">
+              <a:avLst/>
+            </a:prstTxWarp>
+            <a:spAutoFit/>
+          </a:bodyPr>
+          <a:lstStyle/>
+          <a:p>
+            <a:pPr marL="0" marR="0" lvl="0" indent="0" algn="l" defTabSz="914400" rtl="0" eaLnBrk="0" fontAlgn="base" latinLnBrk="0" hangingPunct="0">
+              <a:lnSpc>
+                <a:spcPct val="100000"/>
+              </a:lnSpc>
+              <a:spcBef>
+                <a:spcPct val="0"/>
+              </a:spcBef>
+              <a:spcAft>
+                <a:spcPct val="0"/>
+              </a:spcAft>
+              <a:buClrTx/>
+              <a:buSzTx/>
+              <a:buFontTx/>
+              <a:buNone/>
+              <a:tabLst/>
+            </a:pPr>
+            <a:r>
+              <a:rPr kumimoji="0" lang="en-US" altLang="en-US" sz="1600" b="0" i="0" u="none" strike="noStrike" cap="none" normalizeH="0" baseline="0" dirty="0">
+                <a:ln>
+                  <a:noFill/>
+                </a:ln>
+                <a:solidFill>
+                  <a:schemeClr val="tx1"/>
+                </a:solidFill>
+                <a:effectLst/>
+                <a:latin typeface="var(--jp-code-font-family)"/>
+              </a:rPr>
+              <a:t>count 500.000000 </a:t>
+            </a:r>
+          </a:p>
+          <a:p>
+            <a:pPr marL="0" marR="0" lvl="0" indent="0" algn="l" defTabSz="914400" rtl="0" eaLnBrk="0" fontAlgn="base" latinLnBrk="0" hangingPunct="0">
+              <a:lnSpc>
+                <a:spcPct val="100000"/>
+              </a:lnSpc>
+              <a:spcBef>
+                <a:spcPct val="0"/>
+              </a:spcBef>
+              <a:spcAft>
+                <a:spcPct val="0"/>
+              </a:spcAft>
+              <a:buClrTx/>
+              <a:buSzTx/>
+              <a:buFontTx/>
+              <a:buNone/>
+              <a:tabLst/>
+            </a:pPr>
+            <a:r>
+              <a:rPr kumimoji="0" lang="en-US" altLang="en-US" sz="1600" b="0" i="0" u="none" strike="noStrike" cap="none" normalizeH="0" baseline="0" dirty="0">
+                <a:ln>
+                  <a:noFill/>
+                </a:ln>
+                <a:solidFill>
+                  <a:schemeClr val="tx1"/>
+                </a:solidFill>
+                <a:effectLst/>
+                <a:latin typeface="var(--jp-code-font-family)"/>
+              </a:rPr>
+              <a:t>mean 1.523473 </a:t>
+            </a:r>
+          </a:p>
+          <a:p>
+            <a:pPr marL="0" marR="0" lvl="0" indent="0" algn="l" defTabSz="914400" rtl="0" eaLnBrk="0" fontAlgn="base" latinLnBrk="0" hangingPunct="0">
+              <a:lnSpc>
+                <a:spcPct val="100000"/>
+              </a:lnSpc>
+              <a:spcBef>
+                <a:spcPct val="0"/>
+              </a:spcBef>
+              <a:spcAft>
+                <a:spcPct val="0"/>
+              </a:spcAft>
+              <a:buClrTx/>
+              <a:buSzTx/>
+              <a:buFontTx/>
+              <a:buNone/>
+              <a:tabLst/>
+            </a:pPr>
+            <a:r>
+              <a:rPr kumimoji="0" lang="en-US" altLang="en-US" sz="1600" b="0" i="0" u="none" strike="noStrike" cap="none" normalizeH="0" baseline="0" dirty="0">
+                <a:ln>
+                  <a:noFill/>
+                </a:ln>
+                <a:solidFill>
+                  <a:schemeClr val="tx1"/>
+                </a:solidFill>
+                <a:effectLst/>
+                <a:latin typeface="var(--jp-code-font-family)"/>
+              </a:rPr>
+              <a:t>std 0.359308 </a:t>
+            </a:r>
+          </a:p>
+          <a:p>
+            <a:pPr marL="0" marR="0" lvl="0" indent="0" algn="l" defTabSz="914400" rtl="0" eaLnBrk="0" fontAlgn="base" latinLnBrk="0" hangingPunct="0">
+              <a:lnSpc>
+                <a:spcPct val="100000"/>
+              </a:lnSpc>
+              <a:spcBef>
+                <a:spcPct val="0"/>
+              </a:spcBef>
+              <a:spcAft>
+                <a:spcPct val="0"/>
+              </a:spcAft>
+              <a:buClrTx/>
+              <a:buSzTx/>
+              <a:buFontTx/>
+              <a:buNone/>
+              <a:tabLst/>
+            </a:pPr>
+            <a:r>
+              <a:rPr kumimoji="0" lang="en-US" altLang="en-US" sz="1600" b="0" i="0" u="none" strike="noStrike" cap="none" normalizeH="0" baseline="0" dirty="0">
+                <a:ln>
+                  <a:noFill/>
+                </a:ln>
+                <a:solidFill>
+                  <a:schemeClr val="tx1"/>
+                </a:solidFill>
+                <a:effectLst/>
+                <a:latin typeface="var(--jp-code-font-family)"/>
+              </a:rPr>
+              <a:t>min 0.823825 </a:t>
+            </a:r>
+          </a:p>
+          <a:p>
+            <a:pPr marL="0" marR="0" lvl="0" indent="0" algn="l" defTabSz="914400" rtl="0" eaLnBrk="0" fontAlgn="base" latinLnBrk="0" hangingPunct="0">
+              <a:lnSpc>
+                <a:spcPct val="100000"/>
+              </a:lnSpc>
+              <a:spcBef>
+                <a:spcPct val="0"/>
+              </a:spcBef>
+              <a:spcAft>
+                <a:spcPct val="0"/>
+              </a:spcAft>
+              <a:buClrTx/>
+              <a:buSzTx/>
+              <a:buFontTx/>
+              <a:buNone/>
+              <a:tabLst/>
+            </a:pPr>
+            <a:r>
+              <a:rPr kumimoji="0" lang="en-US" altLang="en-US" sz="1600" b="0" i="0" u="none" strike="noStrike" cap="none" normalizeH="0" baseline="0" dirty="0">
+                <a:ln>
+                  <a:noFill/>
+                </a:ln>
+                <a:solidFill>
+                  <a:schemeClr val="tx1"/>
+                </a:solidFill>
+                <a:effectLst/>
+                <a:latin typeface="var(--jp-code-font-family)"/>
+              </a:rPr>
+              <a:t>25% 1.264320 </a:t>
+            </a:r>
+          </a:p>
+          <a:p>
+            <a:pPr marL="0" marR="0" lvl="0" indent="0" algn="l" defTabSz="914400" rtl="0" eaLnBrk="0" fontAlgn="base" latinLnBrk="0" hangingPunct="0">
+              <a:lnSpc>
+                <a:spcPct val="100000"/>
+              </a:lnSpc>
+              <a:spcBef>
+                <a:spcPct val="0"/>
+              </a:spcBef>
+              <a:spcAft>
+                <a:spcPct val="0"/>
+              </a:spcAft>
+              <a:buClrTx/>
+              <a:buSzTx/>
+              <a:buFontTx/>
+              <a:buNone/>
+              <a:tabLst/>
+            </a:pPr>
+            <a:r>
+              <a:rPr kumimoji="0" lang="en-US" altLang="en-US" sz="1600" b="0" i="0" u="none" strike="noStrike" cap="none" normalizeH="0" baseline="0" dirty="0">
+                <a:ln>
+                  <a:noFill/>
+                </a:ln>
+                <a:solidFill>
+                  <a:schemeClr val="tx1"/>
+                </a:solidFill>
+                <a:effectLst/>
+                <a:latin typeface="var(--jp-code-font-family)"/>
+              </a:rPr>
+              <a:t>50% 1.498127 </a:t>
+            </a:r>
+          </a:p>
+          <a:p>
+            <a:pPr marL="0" marR="0" lvl="0" indent="0" algn="l" defTabSz="914400" rtl="0" eaLnBrk="0" fontAlgn="base" latinLnBrk="0" hangingPunct="0">
+              <a:lnSpc>
+                <a:spcPct val="100000"/>
+              </a:lnSpc>
+              <a:spcBef>
+                <a:spcPct val="0"/>
+              </a:spcBef>
+              <a:spcAft>
+                <a:spcPct val="0"/>
+              </a:spcAft>
+              <a:buClrTx/>
+              <a:buSzTx/>
+              <a:buFontTx/>
+              <a:buNone/>
+              <a:tabLst/>
+            </a:pPr>
+            <a:r>
+              <a:rPr kumimoji="0" lang="en-US" altLang="en-US" sz="1600" b="0" i="0" u="none" strike="noStrike" cap="none" normalizeH="0" baseline="0" dirty="0">
+                <a:ln>
+                  <a:noFill/>
+                </a:ln>
+                <a:solidFill>
+                  <a:schemeClr val="tx1"/>
+                </a:solidFill>
+                <a:effectLst/>
+                <a:latin typeface="var(--jp-code-font-family)"/>
+              </a:rPr>
+              <a:t>75% 1.737534 </a:t>
+            </a:r>
+          </a:p>
+          <a:p>
+            <a:pPr marL="0" marR="0" lvl="0" indent="0" algn="l" defTabSz="914400" rtl="0" eaLnBrk="0" fontAlgn="base" latinLnBrk="0" hangingPunct="0">
+              <a:lnSpc>
+                <a:spcPct val="100000"/>
+              </a:lnSpc>
+              <a:spcBef>
+                <a:spcPct val="0"/>
+              </a:spcBef>
+              <a:spcAft>
+                <a:spcPct val="0"/>
+              </a:spcAft>
+              <a:buClrTx/>
+              <a:buSzTx/>
+              <a:buFontTx/>
+              <a:buNone/>
+              <a:tabLst/>
+            </a:pPr>
+            <a:r>
+              <a:rPr kumimoji="0" lang="en-US" altLang="en-US" sz="1600" b="0" i="0" u="none" strike="noStrike" cap="none" normalizeH="0" baseline="0" dirty="0">
+                <a:ln>
+                  <a:noFill/>
+                </a:ln>
+                <a:solidFill>
+                  <a:schemeClr val="tx1"/>
+                </a:solidFill>
+                <a:effectLst/>
+                <a:latin typeface="var(--jp-code-font-family)"/>
+              </a:rPr>
+              <a:t>max 3.029722 95% </a:t>
+            </a:r>
+          </a:p>
+          <a:p>
+            <a:pPr marL="0" marR="0" lvl="0" indent="0" algn="l" defTabSz="914400" rtl="0" eaLnBrk="0" fontAlgn="base" latinLnBrk="0" hangingPunct="0">
+              <a:lnSpc>
+                <a:spcPct val="100000"/>
+              </a:lnSpc>
+              <a:spcBef>
+                <a:spcPct val="0"/>
+              </a:spcBef>
+              <a:spcAft>
+                <a:spcPct val="0"/>
+              </a:spcAft>
+              <a:buClrTx/>
+              <a:buSzTx/>
+              <a:buFontTx/>
+              <a:buNone/>
+              <a:tabLst/>
+            </a:pPr>
+            <a:r>
+              <a:rPr kumimoji="0" lang="en-US" altLang="en-US" sz="1600" b="0" i="0" u="none" strike="noStrike" cap="none" normalizeH="0" baseline="0" dirty="0">
+                <a:ln>
+                  <a:noFill/>
+                </a:ln>
+                <a:solidFill>
+                  <a:schemeClr val="tx1"/>
+                </a:solidFill>
+                <a:effectLst/>
+                <a:latin typeface="var(--jp-code-font-family)"/>
+              </a:rPr>
+              <a:t>CI Lower 0.943032 95% </a:t>
+            </a:r>
+          </a:p>
+          <a:p>
+            <a:pPr marL="0" marR="0" lvl="0" indent="0" algn="l" defTabSz="914400" rtl="0" eaLnBrk="0" fontAlgn="base" latinLnBrk="0" hangingPunct="0">
+              <a:lnSpc>
+                <a:spcPct val="100000"/>
+              </a:lnSpc>
+              <a:spcBef>
+                <a:spcPct val="0"/>
+              </a:spcBef>
+              <a:spcAft>
+                <a:spcPct val="0"/>
+              </a:spcAft>
+              <a:buClrTx/>
+              <a:buSzTx/>
+              <a:buFontTx/>
+              <a:buNone/>
+              <a:tabLst/>
+            </a:pPr>
+            <a:r>
+              <a:rPr kumimoji="0" lang="en-US" altLang="en-US" sz="1600" b="0" i="0" u="none" strike="noStrike" cap="none" normalizeH="0" baseline="0" dirty="0">
+                <a:ln>
+                  <a:noFill/>
+                </a:ln>
+                <a:solidFill>
+                  <a:schemeClr val="tx1"/>
+                </a:solidFill>
+                <a:effectLst/>
+                <a:latin typeface="var(--jp-code-font-family)"/>
+              </a:rPr>
+              <a:t>CI Upper 2.314443</a:t>
+            </a:r>
+            <a:r>
+              <a:rPr kumimoji="0" lang="en-US" altLang="en-US" sz="1600" b="0" i="0" u="none" strike="noStrike" cap="none" normalizeH="0" baseline="0" dirty="0">
+                <a:ln>
+                  <a:noFill/>
+                </a:ln>
+                <a:solidFill>
+                  <a:schemeClr val="tx1"/>
+                </a:solidFill>
+                <a:effectLst/>
+              </a:rPr>
+              <a:t> </a:t>
+            </a:r>
+            <a:endParaRPr kumimoji="0" lang="en-US" altLang="en-US" sz="1600" b="0" i="0" u="none" strike="noStrike" cap="none" normalizeH="0" baseline="0" dirty="0">
+              <a:ln>
+                <a:noFill/>
+              </a:ln>
+              <a:solidFill>
+                <a:schemeClr val="tx1"/>
+              </a:solidFill>
+              <a:effectLst/>
+              <a:latin typeface="Arial" panose="020B0604020202020204" pitchFamily="34" charset="0"/>
+            </a:endParaRPr>
+          </a:p>
+        </p:txBody>
+      </p:sp>
+      <p:sp>
+        <p:nvSpPr>
+          <p:cNvPr id="9" name="Rectangle 3">
+            <a:extLst>
+              <a:ext uri="{FF2B5EF4-FFF2-40B4-BE49-F238E27FC236}">
+                <a16:creationId xmlns:a16="http://schemas.microsoft.com/office/drawing/2014/main" id="{D7234067-148F-46BF-B20A-0A6B397C0C60}"/>
+              </a:ext>
+            </a:extLst>
+          </p:cNvPr>
+          <p:cNvSpPr>
+            <a:spLocks noChangeArrowheads="1"/>
+          </p:cNvSpPr>
+          <p:nvPr/>
+        </p:nvSpPr>
+        <p:spPr bwMode="auto">
+          <a:xfrm>
+            <a:off x="1088571" y="5333775"/>
+            <a:ext cx="8371587" cy="246221"/>
+          </a:xfrm>
+          <a:prstGeom prst="rect">
+            <a:avLst/>
+          </a:prstGeom>
+          <a:solidFill>
+            <a:srgbClr val="FFFFFF"/>
+          </a:solidFill>
+          <a:ln>
+            <a:noFill/>
+          </a:ln>
+          <a:effectLst/>
+          <a:extLst>
+            <a:ext uri="{91240B29-F687-4F45-9708-019B960494DF}">
+              <a14:hiddenLine xmlns:a14="http://schemas.microsoft.com/office/drawing/2010/main" w="9525">
+                <a:solidFill>
+                  <a:schemeClr val="tx1"/>
+                </a:solidFill>
+                <a:miter lim="800000"/>
+                <a:headEnd/>
+                <a:tailEnd/>
+              </a14:hiddenLine>
+            </a:ext>
+            <a:ext uri="{AF507438-7753-43E0-B8FC-AC1667EBCBE1}">
+              <a14:hiddenEffects xmlns:a14="http://schemas.microsoft.com/office/drawing/2010/main">
+                <a:effectLst>
+                  <a:outerShdw dist="35921" dir="2700000" algn="ctr" rotWithShape="0">
+                    <a:schemeClr val="bg2"/>
+                  </a:outerShdw>
+                </a:effectLst>
+              </a14:hiddenEffects>
+            </a:ext>
+          </a:extLst>
+        </p:spPr>
+        <p:txBody>
+          <a:bodyPr vert="horz" wrap="none" lIns="0" tIns="0" rIns="0" bIns="0" numCol="1" anchor="ctr" anchorCtr="0" compatLnSpc="1">
+            <a:prstTxWarp prst="textNoShape">
+              <a:avLst/>
+            </a:prstTxWarp>
+            <a:spAutoFit/>
+          </a:bodyPr>
+          <a:lstStyle/>
+          <a:p>
+            <a:pPr marL="0" marR="0" lvl="0" indent="0" algn="l" defTabSz="914400" rtl="0" eaLnBrk="0" fontAlgn="base" latinLnBrk="0" hangingPunct="0">
+              <a:lnSpc>
+                <a:spcPct val="100000"/>
+              </a:lnSpc>
+              <a:spcBef>
+                <a:spcPct val="0"/>
+              </a:spcBef>
+              <a:spcAft>
+                <a:spcPct val="0"/>
+              </a:spcAft>
+              <a:buClrTx/>
+              <a:buSzTx/>
+              <a:buFontTx/>
+              <a:buNone/>
+              <a:tabLst/>
+            </a:pPr>
+            <a:r>
+              <a:rPr kumimoji="0" lang="en-US" altLang="en-US" sz="1600" b="0" i="0" u="none" strike="noStrike" cap="none" normalizeH="0" baseline="0" dirty="0">
+                <a:ln>
+                  <a:noFill/>
+                </a:ln>
+                <a:solidFill>
+                  <a:schemeClr val="tx1"/>
+                </a:solidFill>
+                <a:effectLst/>
+                <a:latin typeface="var(--jp-code-font-family)"/>
+              </a:rPr>
+              <a:t>There is a 95% chance that an initial investment of $10,000 in the portfolio $9430.32 and $23144.43</a:t>
+            </a:r>
+            <a:r>
+              <a:rPr kumimoji="0" lang="en-US" altLang="en-US" sz="1000" b="0" i="0" u="none" strike="noStrike" cap="none" normalizeH="0" baseline="0" dirty="0">
+                <a:ln>
+                  <a:noFill/>
+                </a:ln>
+                <a:solidFill>
+                  <a:schemeClr val="tx1"/>
+                </a:solidFill>
+                <a:effectLst/>
+                <a:latin typeface="var(--jp-code-font-family)"/>
+              </a:rPr>
+              <a:t>.</a:t>
+            </a:r>
+            <a:r>
+              <a:rPr kumimoji="0" lang="en-US" altLang="en-US" sz="800" b="0" i="0" u="none" strike="noStrike" cap="none" normalizeH="0" baseline="0" dirty="0">
+                <a:ln>
+                  <a:noFill/>
+                </a:ln>
+                <a:solidFill>
+                  <a:schemeClr val="tx1"/>
+                </a:solidFill>
+                <a:effectLst/>
+              </a:rPr>
+              <a:t> </a:t>
+            </a:r>
+            <a:endParaRPr kumimoji="0" lang="en-US" altLang="en-US" sz="1800" b="0" i="0" u="none" strike="noStrike" cap="none" normalizeH="0" baseline="0" dirty="0">
+              <a:ln>
+                <a:noFill/>
+              </a:ln>
+              <a:solidFill>
+                <a:schemeClr val="tx1"/>
+              </a:solidFill>
+              <a:effectLst/>
+              <a:latin typeface="Arial" panose="020B0604020202020204" pitchFamily="34" charset="0"/>
+            </a:endParaRPr>
+          </a:p>
+        </p:txBody>
+      </p:sp>
+    </p:spTree>
+    <p:extLst>
+      <p:ext uri="{BB962C8B-B14F-4D97-AF65-F5344CB8AC3E}">
+        <p14:creationId xmlns:p14="http://schemas.microsoft.com/office/powerpoint/2010/main" val="3894897037"/>
       </p:ext>
     </p:extLst>
   </p:cSld>
@@ -3812,12 +4466,66 @@
           <a:chExt cx="0" cy="0"/>
         </a:xfrm>
       </p:grpSpPr>
+      <p:sp>
+        <p:nvSpPr>
+          <p:cNvPr id="2" name="Title 1">
+            <a:extLst>
+              <a:ext uri="{FF2B5EF4-FFF2-40B4-BE49-F238E27FC236}">
+                <a16:creationId xmlns:a16="http://schemas.microsoft.com/office/drawing/2014/main" id="{0AAD3894-1885-40D9-AA79-3799F3A072DE}"/>
+              </a:ext>
+            </a:extLst>
+          </p:cNvPr>
+          <p:cNvSpPr>
+            <a:spLocks noGrp="1"/>
+          </p:cNvSpPr>
+          <p:nvPr>
+            <p:ph type="title"/>
+          </p:nvPr>
+        </p:nvSpPr>
+        <p:spPr>
+          <a:xfrm>
+            <a:off x="838200" y="365125"/>
+            <a:ext cx="10515600" cy="685753"/>
+          </a:xfrm>
+        </p:spPr>
+        <p:txBody>
+          <a:bodyPr>
+            <a:normAutofit fontScale="90000"/>
+          </a:bodyPr>
+          <a:lstStyle/>
+          <a:p>
+            <a:r>
+              <a:rPr lang="en-US" dirty="0"/>
+              <a:t>WABP – </a:t>
+            </a:r>
+            <a:r>
+              <a:rPr lang="en-US" sz="3600" dirty="0"/>
+              <a:t>Win Above Base Portfolio/Replacement Portfolio</a:t>
+            </a:r>
+            <a:br>
+              <a:rPr lang="en-US" sz="3600" dirty="0"/>
+            </a:br>
+            <a:r>
+              <a:rPr lang="en-US" sz="3600" dirty="0"/>
+              <a:t>(</a:t>
+            </a:r>
+            <a:r>
+              <a:rPr lang="en-US" sz="3600" dirty="0" err="1"/>
+              <a:t>couresy</a:t>
+            </a:r>
+            <a:r>
+              <a:rPr lang="en-US" sz="3600" dirty="0"/>
+              <a:t> Artemis Capital Management)</a:t>
+            </a:r>
+          </a:p>
+        </p:txBody>
+      </p:sp>
       <p:pic>
         <p:nvPicPr>
-          <p:cNvPr id="13" name="Content Placeholder 12" descr="Chart, waterfall chart&#10;&#10;Description automatically generated">
-            <a:extLst>
-              <a:ext uri="{FF2B5EF4-FFF2-40B4-BE49-F238E27FC236}">
-                <a16:creationId xmlns:a16="http://schemas.microsoft.com/office/drawing/2014/main" id="{68C04CBC-6CA0-41C6-995A-C17F6EB3536A}"/>
+          <p:cNvPr id="9" name="Content Placeholder 8" descr="Timeline&#10;&#10;Description automatically generated with medium confidence">
+            <a:extLst>
+              <a:ext uri="{FF2B5EF4-FFF2-40B4-BE49-F238E27FC236}">
+                <a16:creationId xmlns:a16="http://schemas.microsoft.com/office/drawing/2014/main" id="{9787BCE6-E945-4113-8E29-4B876294E50D}"/>
               </a:ext>
             </a:extLst>
           </p:cNvPr>
@@ -3842,15 +4550,15 @@
         </p:blipFill>
         <p:spPr>
           <a:xfrm>
-            <a:off x="459475" y="859810"/>
-            <a:ext cx="11273049" cy="4831307"/>
+            <a:off x="838199" y="1388896"/>
+            <a:ext cx="7227627" cy="5213620"/>
           </a:xfrm>
         </p:spPr>
       </p:pic>
     </p:spTree>
     <p:extLst>
       <p:ext uri="{BB962C8B-B14F-4D97-AF65-F5344CB8AC3E}">
-        <p14:creationId xmlns:p14="http://schemas.microsoft.com/office/powerpoint/2010/main" val="2487006256"/>
+        <p14:creationId xmlns:p14="http://schemas.microsoft.com/office/powerpoint/2010/main" val="3180819893"/>
       </p:ext>
     </p:extLst>
   </p:cSld>
@@ -3879,10 +4587,10 @@
       </p:grpSpPr>
       <p:pic>
         <p:nvPicPr>
-          <p:cNvPr id="5" name="Content Placeholder 4" descr="Chart, bar chart&#10;&#10;Description automatically generated">
-            <a:extLst>
-              <a:ext uri="{FF2B5EF4-FFF2-40B4-BE49-F238E27FC236}">
-                <a16:creationId xmlns:a16="http://schemas.microsoft.com/office/drawing/2014/main" id="{0321EF21-EB48-469C-ADC1-FF42006D4AD9}"/>
+          <p:cNvPr id="17" name="Content Placeholder 16" descr="Chart, waterfall chart&#10;&#10;Description automatically generated">
+            <a:extLst>
+              <a:ext uri="{FF2B5EF4-FFF2-40B4-BE49-F238E27FC236}">
+                <a16:creationId xmlns:a16="http://schemas.microsoft.com/office/drawing/2014/main" id="{32D8DE3F-793A-4803-B88D-17B144D124C9}"/>
               </a:ext>
             </a:extLst>
           </p:cNvPr>
@@ -3907,15 +4615,15 @@
         </p:blipFill>
         <p:spPr>
           <a:xfrm>
-            <a:off x="442130" y="612444"/>
-            <a:ext cx="11499945" cy="4928548"/>
+            <a:off x="90986" y="641444"/>
+            <a:ext cx="12101014" cy="5186149"/>
           </a:xfrm>
         </p:spPr>
       </p:pic>
     </p:spTree>
     <p:extLst>
       <p:ext uri="{BB962C8B-B14F-4D97-AF65-F5344CB8AC3E}">
-        <p14:creationId xmlns:p14="http://schemas.microsoft.com/office/powerpoint/2010/main" val="1221177635"/>
+        <p14:creationId xmlns:p14="http://schemas.microsoft.com/office/powerpoint/2010/main" val="2487006256"/>
       </p:ext>
     </p:extLst>
   </p:cSld>
@@ -3944,6 +4652,71 @@
       </p:grpSpPr>
       <p:pic>
         <p:nvPicPr>
+          <p:cNvPr id="5" name="Content Placeholder 4" descr="Chart, bar chart&#10;&#10;Description automatically generated">
+            <a:extLst>
+              <a:ext uri="{FF2B5EF4-FFF2-40B4-BE49-F238E27FC236}">
+                <a16:creationId xmlns:a16="http://schemas.microsoft.com/office/drawing/2014/main" id="{0321EF21-EB48-469C-ADC1-FF42006D4AD9}"/>
+              </a:ext>
+            </a:extLst>
+          </p:cNvPr>
+          <p:cNvPicPr>
+            <a:picLocks noGrp="1" noChangeAspect="1"/>
+          </p:cNvPicPr>
+          <p:nvPr>
+            <p:ph idx="1"/>
+          </p:nvPr>
+        </p:nvPicPr>
+        <p:blipFill>
+          <a:blip r:embed="rId2">
+            <a:extLst>
+              <a:ext uri="{28A0092B-C50C-407E-A947-70E740481C1C}">
+                <a14:useLocalDpi xmlns:a14="http://schemas.microsoft.com/office/drawing/2010/main" val="0"/>
+              </a:ext>
+            </a:extLst>
+          </a:blip>
+          <a:stretch>
+            <a:fillRect/>
+          </a:stretch>
+        </p:blipFill>
+        <p:spPr>
+          <a:xfrm>
+            <a:off x="442130" y="612444"/>
+            <a:ext cx="11499945" cy="4928548"/>
+          </a:xfrm>
+        </p:spPr>
+      </p:pic>
+    </p:spTree>
+    <p:extLst>
+      <p:ext uri="{BB962C8B-B14F-4D97-AF65-F5344CB8AC3E}">
+        <p14:creationId xmlns:p14="http://schemas.microsoft.com/office/powerpoint/2010/main" val="1221177635"/>
+      </p:ext>
+    </p:extLst>
+  </p:cSld>
+  <p:clrMapOvr>
+    <a:masterClrMapping/>
+  </p:clrMapOvr>
+</p:sld>
+</file>
+
+<file path=ppt/slides/slide6.xml><?xml version="1.0" encoding="utf-8"?>
+<p:sld xmlns:a="http://schemas.openxmlformats.org/drawingml/2006/main" xmlns:r="http://schemas.openxmlformats.org/officeDocument/2006/relationships" xmlns:p="http://schemas.openxmlformats.org/presentationml/2006/main">
+  <p:cSld>
+    <p:spTree>
+      <p:nvGrpSpPr>
+        <p:cNvPr id="1" name=""/>
+        <p:cNvGrpSpPr/>
+        <p:nvPr/>
+      </p:nvGrpSpPr>
+      <p:grpSpPr>
+        <a:xfrm>
+          <a:off x="0" y="0"/>
+          <a:ext cx="0" cy="0"/>
+          <a:chOff x="0" y="0"/>
+          <a:chExt cx="0" cy="0"/>
+        </a:xfrm>
+      </p:grpSpPr>
+      <p:pic>
+        <p:nvPicPr>
           <p:cNvPr id="5" name="Picture 4" descr="Chart, bar chart&#10;&#10;Description automatically generated">
             <a:extLst>
               <a:ext uri="{FF2B5EF4-FFF2-40B4-BE49-F238E27FC236}">
@@ -3991,7 +4764,7 @@
 </p:sld>
 </file>
 
-<file path=ppt/slides/slide6.xml><?xml version="1.0" encoding="utf-8"?>
+<file path=ppt/slides/slide7.xml><?xml version="1.0" encoding="utf-8"?>
 <p:sld xmlns:a="http://schemas.openxmlformats.org/drawingml/2006/main" xmlns:r="http://schemas.openxmlformats.org/officeDocument/2006/relationships" xmlns:p="http://schemas.openxmlformats.org/presentationml/2006/main">
   <p:cSld>
     <p:spTree>
@@ -4057,7 +4830,7 @@
 </p:sld>
 </file>
 
-<file path=ppt/slides/slide7.xml><?xml version="1.0" encoding="utf-8"?>
+<file path=ppt/slides/slide8.xml><?xml version="1.0" encoding="utf-8"?>
 <p:sld xmlns:a="http://schemas.openxmlformats.org/drawingml/2006/main" xmlns:r="http://schemas.openxmlformats.org/officeDocument/2006/relationships" xmlns:p="http://schemas.openxmlformats.org/presentationml/2006/main">
   <p:cSld>
     <p:spTree>
@@ -4123,7 +4896,7 @@
 </p:sld>
 </file>
 
-<file path=ppt/slides/slide8.xml><?xml version="1.0" encoding="utf-8"?>
+<file path=ppt/slides/slide9.xml><?xml version="1.0" encoding="utf-8"?>
 <p:sld xmlns:a="http://schemas.openxmlformats.org/drawingml/2006/main" xmlns:r="http://schemas.openxmlformats.org/officeDocument/2006/relationships" xmlns:p="http://schemas.openxmlformats.org/presentationml/2006/main">
   <p:cSld>
     <p:bg>
@@ -4188,72 +4961,6 @@
     <p:extLst>
       <p:ext uri="{BB962C8B-B14F-4D97-AF65-F5344CB8AC3E}">
         <p14:creationId xmlns:p14="http://schemas.microsoft.com/office/powerpoint/2010/main" val="2284027618"/>
-      </p:ext>
-    </p:extLst>
-  </p:cSld>
-  <p:clrMapOvr>
-    <a:masterClrMapping/>
-  </p:clrMapOvr>
-</p:sld>
-</file>
-
-<file path=ppt/slides/slide9.xml><?xml version="1.0" encoding="utf-8"?>
-<p:sld xmlns:a="http://schemas.openxmlformats.org/drawingml/2006/main" xmlns:r="http://schemas.openxmlformats.org/officeDocument/2006/relationships" xmlns:p="http://schemas.openxmlformats.org/presentationml/2006/main">
-  <p:cSld>
-    <p:spTree>
-      <p:nvGrpSpPr>
-        <p:cNvPr id="1" name=""/>
-        <p:cNvGrpSpPr/>
-        <p:nvPr/>
-      </p:nvGrpSpPr>
-      <p:grpSpPr>
-        <a:xfrm>
-          <a:off x="0" y="0"/>
-          <a:ext cx="0" cy="0"/>
-          <a:chOff x="0" y="0"/>
-          <a:chExt cx="0" cy="0"/>
-        </a:xfrm>
-      </p:grpSpPr>
-      <p:pic>
-        <p:nvPicPr>
-          <p:cNvPr id="5" name="Picture 4" descr="Chart, waterfall chart&#10;&#10;Description automatically generated">
-            <a:extLst>
-              <a:ext uri="{FF2B5EF4-FFF2-40B4-BE49-F238E27FC236}">
-                <a16:creationId xmlns:a16="http://schemas.microsoft.com/office/drawing/2014/main" id="{5FFDE442-0C81-41D1-B661-F996A69E7357}"/>
-              </a:ext>
-            </a:extLst>
-          </p:cNvPr>
-          <p:cNvPicPr>
-            <a:picLocks noChangeAspect="1"/>
-          </p:cNvPicPr>
-          <p:nvPr/>
-        </p:nvPicPr>
-        <p:blipFill>
-          <a:blip r:embed="rId2">
-            <a:extLst>
-              <a:ext uri="{28A0092B-C50C-407E-A947-70E740481C1C}">
-                <a14:useLocalDpi xmlns:a14="http://schemas.microsoft.com/office/drawing/2010/main" val="0"/>
-              </a:ext>
-            </a:extLst>
-          </a:blip>
-          <a:stretch>
-            <a:fillRect/>
-          </a:stretch>
-        </p:blipFill>
-        <p:spPr>
-          <a:xfrm>
-            <a:off x="442684" y="963385"/>
-            <a:ext cx="11506201" cy="4931229"/>
-          </a:xfrm>
-          <a:prstGeom prst="rect">
-            <a:avLst/>
-          </a:prstGeom>
-        </p:spPr>
-      </p:pic>
-    </p:spTree>
-    <p:extLst>
-      <p:ext uri="{BB962C8B-B14F-4D97-AF65-F5344CB8AC3E}">
-        <p14:creationId xmlns:p14="http://schemas.microsoft.com/office/powerpoint/2010/main" val="45471021"/>
       </p:ext>
     </p:extLst>
   </p:cSld>

</xml_diff>